<commit_message>
PPT and Retrospective 4
</commit_message>
<xml_diff>
--- a/docs/sprint4/Presentation_SPG_Sprint4.pptx
+++ b/docs/sprint4/Presentation_SPG_Sprint4.pptx
@@ -15,8 +15,8 @@
     <p:sldId id="282" r:id="rId6"/>
     <p:sldId id="279" r:id="rId7"/>
     <p:sldId id="283" r:id="rId8"/>
-    <p:sldId id="284" r:id="rId9"/>
-    <p:sldId id="281" r:id="rId10"/>
+    <p:sldId id="285" r:id="rId9"/>
+    <p:sldId id="284" r:id="rId10"/>
     <p:sldId id="269" r:id="rId11"/>
   </p:sldIdLst>
   <p:sldSz cx="12192000" cy="6858000"/>
@@ -206,7 +206,7 @@
           <a:p>
             <a:fld id="{314F6EEB-D563-49C4-B49C-62F84641FA35}" type="datetimeFigureOut">
               <a:rPr lang="en-GB" smtClean="0"/>
-              <a:t>10/01/2022</a:t>
+              <a:t>11/01/2022</a:t>
             </a:fld>
             <a:endParaRPr lang="en-GB"/>
           </a:p>
@@ -365,7 +365,7 @@
           <a:p>
             <a:fld id="{0FACFF8E-9E3A-4CBA-9CCB-6EA21DDFDE6F}" type="slidenum">
               <a:rPr lang="en-GB" smtClean="0"/>
-              <a:t>‹#›</a:t>
+              <a:t>‹N›</a:t>
             </a:fld>
             <a:endParaRPr lang="en-GB"/>
           </a:p>
@@ -884,7 +884,7 @@
     </p:spTree>
     <p:extLst>
       <p:ext uri="{BB962C8B-B14F-4D97-AF65-F5344CB8AC3E}">
-        <p14:creationId xmlns:p14="http://schemas.microsoft.com/office/powerpoint/2010/main" val="602897084"/>
+        <p14:creationId xmlns:p14="http://schemas.microsoft.com/office/powerpoint/2010/main" val="900972681"/>
       </p:ext>
     </p:extLst>
   </p:cSld>
@@ -968,7 +968,7 @@
     </p:spTree>
     <p:extLst>
       <p:ext uri="{BB962C8B-B14F-4D97-AF65-F5344CB8AC3E}">
-        <p14:creationId xmlns:p14="http://schemas.microsoft.com/office/powerpoint/2010/main" val="3810042147"/>
+        <p14:creationId xmlns:p14="http://schemas.microsoft.com/office/powerpoint/2010/main" val="602897084"/>
       </p:ext>
     </p:extLst>
   </p:cSld>
@@ -1204,7 +1204,7 @@
           <a:p>
             <a:fld id="{1C3789C9-914D-4922-9317-B202C6AB7D8A}" type="datetimeFigureOut">
               <a:rPr lang="en-GB" smtClean="0"/>
-              <a:t>10/01/2022</a:t>
+              <a:t>11/01/2022</a:t>
             </a:fld>
             <a:endParaRPr lang="en-GB"/>
           </a:p>
@@ -1246,7 +1246,7 @@
           <a:p>
             <a:fld id="{F30FCBFB-118C-4C9F-B250-79DE819C5D00}" type="slidenum">
               <a:rPr lang="en-GB" smtClean="0"/>
-              <a:t>‹#›</a:t>
+              <a:t>‹N›</a:t>
             </a:fld>
             <a:endParaRPr lang="en-GB"/>
           </a:p>
@@ -1412,7 +1412,7 @@
           <a:p>
             <a:fld id="{1C3789C9-914D-4922-9317-B202C6AB7D8A}" type="datetimeFigureOut">
               <a:rPr lang="en-GB" smtClean="0"/>
-              <a:t>10/01/2022</a:t>
+              <a:t>11/01/2022</a:t>
             </a:fld>
             <a:endParaRPr lang="en-GB"/>
           </a:p>
@@ -1454,7 +1454,7 @@
           <a:p>
             <a:fld id="{F30FCBFB-118C-4C9F-B250-79DE819C5D00}" type="slidenum">
               <a:rPr lang="en-GB" smtClean="0"/>
-              <a:t>‹#›</a:t>
+              <a:t>‹N›</a:t>
             </a:fld>
             <a:endParaRPr lang="en-GB"/>
           </a:p>
@@ -1668,7 +1668,7 @@
           <a:p>
             <a:fld id="{1C3789C9-914D-4922-9317-B202C6AB7D8A}" type="datetimeFigureOut">
               <a:rPr lang="en-GB" smtClean="0"/>
-              <a:t>10/01/2022</a:t>
+              <a:t>11/01/2022</a:t>
             </a:fld>
             <a:endParaRPr lang="en-GB"/>
           </a:p>
@@ -1710,7 +1710,7 @@
           <a:p>
             <a:fld id="{F30FCBFB-118C-4C9F-B250-79DE819C5D00}" type="slidenum">
               <a:rPr lang="en-GB" smtClean="0"/>
-              <a:t>‹#›</a:t>
+              <a:t>‹N›</a:t>
             </a:fld>
             <a:endParaRPr lang="en-GB"/>
           </a:p>
@@ -1842,7 +1842,7 @@
           <a:p>
             <a:fld id="{1C3789C9-914D-4922-9317-B202C6AB7D8A}" type="datetimeFigureOut">
               <a:rPr lang="en-GB" smtClean="0"/>
-              <a:t>10/01/2022</a:t>
+              <a:t>11/01/2022</a:t>
             </a:fld>
             <a:endParaRPr lang="en-GB"/>
           </a:p>
@@ -1884,7 +1884,7 @@
           <a:p>
             <a:fld id="{F30FCBFB-118C-4C9F-B250-79DE819C5D00}" type="slidenum">
               <a:rPr lang="en-GB" smtClean="0"/>
-              <a:t>‹#›</a:t>
+              <a:t>‹N›</a:t>
             </a:fld>
             <a:endParaRPr lang="en-GB"/>
           </a:p>
@@ -2185,7 +2185,7 @@
           <a:p>
             <a:fld id="{1C3789C9-914D-4922-9317-B202C6AB7D8A}" type="datetimeFigureOut">
               <a:rPr lang="en-GB" smtClean="0"/>
-              <a:t>10/01/2022</a:t>
+              <a:t>11/01/2022</a:t>
             </a:fld>
             <a:endParaRPr lang="en-GB"/>
           </a:p>
@@ -2227,7 +2227,7 @@
           <a:p>
             <a:fld id="{F30FCBFB-118C-4C9F-B250-79DE819C5D00}" type="slidenum">
               <a:rPr lang="en-GB" smtClean="0"/>
-              <a:t>‹#›</a:t>
+              <a:t>‹N›</a:t>
             </a:fld>
             <a:endParaRPr lang="en-GB"/>
           </a:p>
@@ -2460,7 +2460,7 @@
           <a:p>
             <a:fld id="{1C3789C9-914D-4922-9317-B202C6AB7D8A}" type="datetimeFigureOut">
               <a:rPr lang="en-GB" smtClean="0"/>
-              <a:t>10/01/2022</a:t>
+              <a:t>11/01/2022</a:t>
             </a:fld>
             <a:endParaRPr lang="en-GB"/>
           </a:p>
@@ -2502,7 +2502,7 @@
           <a:p>
             <a:fld id="{F30FCBFB-118C-4C9F-B250-79DE819C5D00}" type="slidenum">
               <a:rPr lang="en-GB" smtClean="0"/>
-              <a:t>‹#›</a:t>
+              <a:t>‹N›</a:t>
             </a:fld>
             <a:endParaRPr lang="en-GB"/>
           </a:p>
@@ -2839,7 +2839,7 @@
           <a:p>
             <a:fld id="{1C3789C9-914D-4922-9317-B202C6AB7D8A}" type="datetimeFigureOut">
               <a:rPr lang="en-GB" smtClean="0"/>
-              <a:t>10/01/2022</a:t>
+              <a:t>11/01/2022</a:t>
             </a:fld>
             <a:endParaRPr lang="en-GB"/>
           </a:p>
@@ -2881,7 +2881,7 @@
           <a:p>
             <a:fld id="{F30FCBFB-118C-4C9F-B250-79DE819C5D00}" type="slidenum">
               <a:rPr lang="en-GB" smtClean="0"/>
-              <a:t>‹#›</a:t>
+              <a:t>‹N›</a:t>
             </a:fld>
             <a:endParaRPr lang="en-GB"/>
           </a:p>
@@ -2957,7 +2957,7 @@
           <a:p>
             <a:fld id="{1C3789C9-914D-4922-9317-B202C6AB7D8A}" type="datetimeFigureOut">
               <a:rPr lang="en-GB" smtClean="0"/>
-              <a:t>10/01/2022</a:t>
+              <a:t>11/01/2022</a:t>
             </a:fld>
             <a:endParaRPr lang="en-GB"/>
           </a:p>
@@ -2999,7 +2999,7 @@
           <a:p>
             <a:fld id="{F30FCBFB-118C-4C9F-B250-79DE819C5D00}" type="slidenum">
               <a:rPr lang="en-GB" smtClean="0"/>
-              <a:t>‹#›</a:t>
+              <a:t>‹N›</a:t>
             </a:fld>
             <a:endParaRPr lang="en-GB"/>
           </a:p>
@@ -3128,7 +3128,7 @@
           <a:p>
             <a:fld id="{1C3789C9-914D-4922-9317-B202C6AB7D8A}" type="datetimeFigureOut">
               <a:rPr lang="en-GB" smtClean="0"/>
-              <a:t>10/01/2022</a:t>
+              <a:t>11/01/2022</a:t>
             </a:fld>
             <a:endParaRPr lang="en-GB"/>
           </a:p>
@@ -3178,7 +3178,7 @@
           <a:p>
             <a:fld id="{F30FCBFB-118C-4C9F-B250-79DE819C5D00}" type="slidenum">
               <a:rPr lang="en-GB" smtClean="0"/>
-              <a:t>‹#›</a:t>
+              <a:t>‹N›</a:t>
             </a:fld>
             <a:endParaRPr lang="en-GB"/>
           </a:p>
@@ -3482,7 +3482,7 @@
           <a:p>
             <a:fld id="{1C3789C9-914D-4922-9317-B202C6AB7D8A}" type="datetimeFigureOut">
               <a:rPr lang="en-GB" smtClean="0"/>
-              <a:t>10/01/2022</a:t>
+              <a:t>11/01/2022</a:t>
             </a:fld>
             <a:endParaRPr lang="en-GB"/>
           </a:p>
@@ -3545,7 +3545,7 @@
           <a:p>
             <a:fld id="{F30FCBFB-118C-4C9F-B250-79DE819C5D00}" type="slidenum">
               <a:rPr lang="en-GB" smtClean="0"/>
-              <a:t>‹#›</a:t>
+              <a:t>‹N›</a:t>
             </a:fld>
             <a:endParaRPr lang="en-GB"/>
           </a:p>
@@ -3864,7 +3864,7 @@
           <a:p>
             <a:fld id="{1C3789C9-914D-4922-9317-B202C6AB7D8A}" type="datetimeFigureOut">
               <a:rPr lang="en-GB" smtClean="0"/>
-              <a:t>10/01/2022</a:t>
+              <a:t>11/01/2022</a:t>
             </a:fld>
             <a:endParaRPr lang="en-GB"/>
           </a:p>
@@ -3906,7 +3906,7 @@
           <a:p>
             <a:fld id="{F30FCBFB-118C-4C9F-B250-79DE819C5D00}" type="slidenum">
               <a:rPr lang="en-GB" smtClean="0"/>
-              <a:t>‹#›</a:t>
+              <a:t>‹N›</a:t>
             </a:fld>
             <a:endParaRPr lang="en-GB"/>
           </a:p>
@@ -4151,7 +4151,7 @@
           <a:p>
             <a:fld id="{1C3789C9-914D-4922-9317-B202C6AB7D8A}" type="datetimeFigureOut">
               <a:rPr lang="en-GB" smtClean="0"/>
-              <a:t>10/01/2022</a:t>
+              <a:t>11/01/2022</a:t>
             </a:fld>
             <a:endParaRPr lang="en-GB"/>
           </a:p>
@@ -4225,7 +4225,7 @@
           <a:p>
             <a:fld id="{F30FCBFB-118C-4C9F-B250-79DE819C5D00}" type="slidenum">
               <a:rPr lang="en-GB" smtClean="0"/>
-              <a:t>‹#›</a:t>
+              <a:t>‹N›</a:t>
             </a:fld>
             <a:endParaRPr lang="en-GB"/>
           </a:p>
@@ -5412,7 +5412,7 @@
             <a:pPr algn="ctr"/>
             <a:r>
               <a:rPr lang="en-GB" sz="2800" dirty="0"/>
-              <a:t>12</a:t>
+              <a:t>40</a:t>
             </a:r>
           </a:p>
         </p:txBody>
@@ -5735,7 +5735,7 @@
             <a:pPr algn="ctr"/>
             <a:r>
               <a:rPr lang="en-GB" sz="2800" dirty="0"/>
-              <a:t>13</a:t>
+              <a:t>41</a:t>
             </a:r>
           </a:p>
         </p:txBody>
@@ -5998,7 +5998,7 @@
         </p:nvSpPr>
         <p:spPr>
           <a:xfrm>
-            <a:off x="3060006" y="2321071"/>
+            <a:off x="3076631" y="2321071"/>
             <a:ext cx="858850" cy="830039"/>
           </a:xfrm>
           <a:prstGeom prst="ellipse">
@@ -6033,7 +6033,7 @@
             <a:pPr algn="ctr"/>
             <a:r>
               <a:rPr lang="en-GB" sz="2800" dirty="0"/>
-              <a:t>14</a:t>
+              <a:t>12</a:t>
             </a:r>
           </a:p>
         </p:txBody>
@@ -6285,34 +6285,29 @@
               </a:spcAft>
             </a:pPr>
             <a:r>
-              <a:rPr lang="en-US" sz="2800" dirty="0"/>
-              <a:t>As a </a:t>
-            </a:r>
-            <a:r>
-              <a:rPr lang="en-US" sz="2800" b="1" dirty="0">
+              <a:rPr lang="en-GB" sz="2800" dirty="0"/>
+              <a:t>Make </a:t>
+            </a:r>
+            <a:r>
+              <a:rPr lang="en-GB" sz="2800" b="1" dirty="0">
                 <a:solidFill>
                   <a:schemeClr val="accent1"/>
                 </a:solidFill>
               </a:rPr>
-              <a:t>customer </a:t>
-            </a:r>
-            <a:r>
-              <a:rPr lang="en-US" sz="2800" dirty="0"/>
-              <a:t>I want to have </a:t>
-            </a:r>
-            <a:r>
-              <a:rPr lang="en-US" sz="2800" b="1" dirty="0">
+              <a:t>bigger the web page element </a:t>
+            </a:r>
+            <a:r>
+              <a:rPr lang="en-GB" sz="2800" dirty="0"/>
+              <a:t>for a better </a:t>
+            </a:r>
+            <a:r>
+              <a:rPr lang="en-GB" sz="2800" b="1" dirty="0">
                 <a:solidFill>
                   <a:schemeClr val="accent1"/>
                 </a:solidFill>
               </a:rPr>
-              <a:t>bigger icons in the navbar.</a:t>
-            </a:r>
-            <a:endParaRPr lang="en-GB" sz="2800" b="1" dirty="0">
-              <a:solidFill>
-                <a:srgbClr val="BD582C"/>
-              </a:solidFill>
-            </a:endParaRPr>
+              <a:t>user experience</a:t>
+            </a:r>
           </a:p>
         </p:txBody>
       </p:sp>
@@ -6368,14 +6363,18 @@
           <a:lstStyle/>
           <a:p>
             <a:r>
-              <a:rPr lang="en-GB" b="1" dirty="0">
+              <a:rPr lang="en-US" b="1" dirty="0">
                 <a:solidFill>
                   <a:srgbClr val="BD582C"/>
                 </a:solidFill>
               </a:rPr>
-              <a:t>Storing images</a:t>
-            </a:r>
-            <a:endParaRPr lang="it-IT" dirty="0"/>
+              <a:t>Use placeholders in the form</a:t>
+            </a:r>
+            <a:endParaRPr lang="it-IT" b="1" dirty="0">
+              <a:solidFill>
+                <a:srgbClr val="BD582C"/>
+              </a:solidFill>
+            </a:endParaRPr>
           </a:p>
         </p:txBody>
       </p:sp>
@@ -6426,7 +6425,7 @@
             </a:pPr>
             <a:r>
               <a:rPr lang="en-GB" sz="2800" dirty="0"/>
-              <a:t>It might be useful for the </a:t>
+              <a:t>Help the users </a:t>
             </a:r>
             <a:r>
               <a:rPr lang="en-GB" sz="2800" b="1" dirty="0">
@@ -6434,36 +6433,27 @@
                   <a:schemeClr val="accent1"/>
                 </a:solidFill>
               </a:rPr>
-              <a:t>farmer </a:t>
+              <a:t>to fill any forms </a:t>
             </a:r>
             <a:r>
               <a:rPr lang="en-GB" sz="2800" dirty="0"/>
-              <a:t>to have </a:t>
-            </a:r>
-            <a:r>
-              <a:rPr lang="en-GB" sz="2800" b="1" dirty="0">
-                <a:solidFill>
-                  <a:schemeClr val="accent1"/>
-                </a:solidFill>
-              </a:rPr>
-              <a:t>examples of hight quality and professional images </a:t>
+              <a:t>they might came across during the navigation of the website </a:t>
+            </a:r>
+            <a:r>
+              <a:rPr lang="en-GB" sz="2800"/>
+              <a:t>with extra-indication</a:t>
             </a:r>
             <a:r>
               <a:rPr lang="en-GB" sz="2800" dirty="0"/>
-              <a:t>available when he enter his products of the week / enter new products.</a:t>
-            </a:r>
-            <a:endParaRPr lang="en-GB" sz="2800" b="1" dirty="0">
-              <a:solidFill>
-                <a:srgbClr val="BD582C"/>
-              </a:solidFill>
-            </a:endParaRPr>
+              <a:t>.</a:t>
+            </a:r>
           </a:p>
         </p:txBody>
       </p:sp>
     </p:spTree>
     <p:extLst>
       <p:ext uri="{BB962C8B-B14F-4D97-AF65-F5344CB8AC3E}">
-        <p14:creationId xmlns:p14="http://schemas.microsoft.com/office/powerpoint/2010/main" val="1699485188"/>
+        <p14:creationId xmlns:p14="http://schemas.microsoft.com/office/powerpoint/2010/main" val="2573140561"/>
       </p:ext>
     </p:extLst>
   </p:cSld>
@@ -6517,7 +6507,7 @@
                   <a:srgbClr val="BD582C"/>
                 </a:solidFill>
               </a:rPr>
-              <a:t>Others issues</a:t>
+              <a:t>Storing images</a:t>
             </a:r>
             <a:endParaRPr lang="it-IT" dirty="0"/>
           </a:p>
@@ -6537,8 +6527,8 @@
         </p:nvSpPr>
         <p:spPr>
           <a:xfrm>
-            <a:off x="9567378" y="1985115"/>
-            <a:ext cx="1943952" cy="1238108"/>
+            <a:off x="2315688" y="2573946"/>
+            <a:ext cx="8391029" cy="2546695"/>
           </a:xfrm>
           <a:prstGeom prst="roundRect">
             <a:avLst/>
@@ -6569,719 +6559,45 @@
               </a:spcAft>
             </a:pPr>
             <a:r>
-              <a:rPr lang="en-US" sz="2000" dirty="0"/>
-              <a:t>Add </a:t>
-            </a:r>
-            <a:r>
-              <a:rPr lang="en-US" sz="2000" b="1" dirty="0">
+              <a:rPr lang="en-GB" sz="2800" dirty="0"/>
+              <a:t>It might be useful for the </a:t>
+            </a:r>
+            <a:r>
+              <a:rPr lang="en-GB" sz="2800" b="1" dirty="0">
                 <a:solidFill>
                   <a:schemeClr val="accent1"/>
                 </a:solidFill>
               </a:rPr>
-              <a:t>total price </a:t>
-            </a:r>
-            <a:r>
-              <a:rPr lang="en-US" sz="2000" dirty="0"/>
-              <a:t>to order rows in </a:t>
-            </a:r>
-            <a:r>
-              <a:rPr lang="en-US" sz="2000" dirty="0" err="1"/>
-              <a:t>db</a:t>
-            </a:r>
-            <a:endParaRPr lang="en-GB" sz="2000" dirty="0"/>
-          </a:p>
-        </p:txBody>
-      </p:sp>
-      <p:sp>
-        <p:nvSpPr>
-          <p:cNvPr id="5" name="Rectangle: Rounded Corners 4">
-            <a:extLst>
-              <a:ext uri="{FF2B5EF4-FFF2-40B4-BE49-F238E27FC236}">
-                <a16:creationId xmlns:a16="http://schemas.microsoft.com/office/drawing/2014/main" id="{11F81544-0A68-48FE-8474-DD9497BC4C6E}"/>
-              </a:ext>
-            </a:extLst>
-          </p:cNvPr>
-          <p:cNvSpPr/>
-          <p:nvPr/>
-        </p:nvSpPr>
-        <p:spPr>
-          <a:xfrm>
-            <a:off x="3792785" y="1901056"/>
-            <a:ext cx="1805050" cy="1164640"/>
-          </a:xfrm>
-          <a:prstGeom prst="roundRect">
-            <a:avLst/>
-          </a:prstGeom>
-          <a:ln w="38100"/>
-        </p:spPr>
-        <p:style>
-          <a:lnRef idx="2">
-            <a:schemeClr val="accent2"/>
-          </a:lnRef>
-          <a:fillRef idx="1">
-            <a:schemeClr val="lt1"/>
-          </a:fillRef>
-          <a:effectRef idx="0">
-            <a:schemeClr val="accent2"/>
-          </a:effectRef>
-          <a:fontRef idx="minor">
-            <a:schemeClr val="dk1"/>
-          </a:fontRef>
-        </p:style>
-        <p:txBody>
-          <a:bodyPr rtlCol="0" anchor="ctr"/>
-          <a:lstStyle/>
-          <a:p>
-            <a:pPr algn="ctr">
-              <a:spcAft>
-                <a:spcPts val="1200"/>
-              </a:spcAft>
-            </a:pPr>
-            <a:r>
-              <a:rPr lang="fr-FR" sz="2000" dirty="0" err="1"/>
-              <a:t>Ship</a:t>
-            </a:r>
-            <a:r>
-              <a:rPr lang="fr-FR" sz="2000" dirty="0"/>
-              <a:t> </a:t>
-            </a:r>
-            <a:r>
-              <a:rPr lang="fr-FR" sz="2000" b="1" dirty="0" err="1">
+              <a:t>farmer </a:t>
+            </a:r>
+            <a:r>
+              <a:rPr lang="en-GB" sz="2800" dirty="0"/>
+              <a:t>to have </a:t>
+            </a:r>
+            <a:r>
+              <a:rPr lang="en-GB" sz="2800" b="1" dirty="0">
                 <a:solidFill>
                   <a:schemeClr val="accent1"/>
                 </a:solidFill>
               </a:rPr>
-              <a:t>Homepage</a:t>
-            </a:r>
-            <a:endParaRPr lang="en-GB" sz="2000" b="1" dirty="0">
+              <a:t>examples of hight quality and professional images </a:t>
+            </a:r>
+            <a:r>
+              <a:rPr lang="en-GB" sz="2800" dirty="0"/>
+              <a:t>available when he enter his products of the week / enter new products.</a:t>
+            </a:r>
+            <a:endParaRPr lang="en-GB" sz="2800" b="1" dirty="0">
               <a:solidFill>
-                <a:schemeClr val="accent1"/>
+                <a:srgbClr val="BD582C"/>
               </a:solidFill>
             </a:endParaRPr>
-          </a:p>
-        </p:txBody>
-      </p:sp>
-      <p:sp>
-        <p:nvSpPr>
-          <p:cNvPr id="6" name="Rectangle: Rounded Corners 5">
-            <a:extLst>
-              <a:ext uri="{FF2B5EF4-FFF2-40B4-BE49-F238E27FC236}">
-                <a16:creationId xmlns:a16="http://schemas.microsoft.com/office/drawing/2014/main" id="{B3B7E181-6E47-42B6-BA83-A11A82602526}"/>
-              </a:ext>
-            </a:extLst>
-          </p:cNvPr>
-          <p:cNvSpPr/>
-          <p:nvPr/>
-        </p:nvSpPr>
-        <p:spPr>
-          <a:xfrm>
-            <a:off x="1045427" y="2483376"/>
-            <a:ext cx="2082371" cy="1423898"/>
-          </a:xfrm>
-          <a:prstGeom prst="roundRect">
-            <a:avLst/>
-          </a:prstGeom>
-          <a:ln w="38100"/>
-        </p:spPr>
-        <p:style>
-          <a:lnRef idx="2">
-            <a:schemeClr val="accent2"/>
-          </a:lnRef>
-          <a:fillRef idx="1">
-            <a:schemeClr val="lt1"/>
-          </a:fillRef>
-          <a:effectRef idx="0">
-            <a:schemeClr val="accent2"/>
-          </a:effectRef>
-          <a:fontRef idx="minor">
-            <a:schemeClr val="dk1"/>
-          </a:fontRef>
-        </p:style>
-        <p:txBody>
-          <a:bodyPr rtlCol="0" anchor="ctr"/>
-          <a:lstStyle/>
-          <a:p>
-            <a:pPr algn="ctr">
-              <a:spcAft>
-                <a:spcPts val="1200"/>
-              </a:spcAft>
-            </a:pPr>
-            <a:r>
-              <a:rPr lang="en-US" sz="2000" dirty="0"/>
-              <a:t>Prevent </a:t>
-            </a:r>
-            <a:r>
-              <a:rPr lang="en-US" sz="2000" b="1" dirty="0">
-                <a:solidFill>
-                  <a:schemeClr val="accent1"/>
-                </a:solidFill>
-              </a:rPr>
-              <a:t>Virtual Clock </a:t>
-            </a:r>
-            <a:r>
-              <a:rPr lang="en-US" sz="2000" dirty="0"/>
-              <a:t>from crashing with invalid date</a:t>
-            </a:r>
-            <a:endParaRPr lang="en-GB" sz="2000" dirty="0"/>
-          </a:p>
-        </p:txBody>
-      </p:sp>
-      <p:sp>
-        <p:nvSpPr>
-          <p:cNvPr id="7" name="Rectangle: Rounded Corners 6">
-            <a:extLst>
-              <a:ext uri="{FF2B5EF4-FFF2-40B4-BE49-F238E27FC236}">
-                <a16:creationId xmlns:a16="http://schemas.microsoft.com/office/drawing/2014/main" id="{FAFB2B4B-8B2D-42D9-8A36-5BED90696112}"/>
-              </a:ext>
-            </a:extLst>
-          </p:cNvPr>
-          <p:cNvSpPr/>
-          <p:nvPr/>
-        </p:nvSpPr>
-        <p:spPr>
-          <a:xfrm>
-            <a:off x="3952217" y="4915609"/>
-            <a:ext cx="2344685" cy="1164641"/>
-          </a:xfrm>
-          <a:prstGeom prst="roundRect">
-            <a:avLst/>
-          </a:prstGeom>
-          <a:ln w="38100"/>
-        </p:spPr>
-        <p:style>
-          <a:lnRef idx="2">
-            <a:schemeClr val="accent2"/>
-          </a:lnRef>
-          <a:fillRef idx="1">
-            <a:schemeClr val="lt1"/>
-          </a:fillRef>
-          <a:effectRef idx="0">
-            <a:schemeClr val="accent2"/>
-          </a:effectRef>
-          <a:fontRef idx="minor">
-            <a:schemeClr val="dk1"/>
-          </a:fontRef>
-        </p:style>
-        <p:txBody>
-          <a:bodyPr rtlCol="0" anchor="ctr"/>
-          <a:lstStyle/>
-          <a:p>
-            <a:pPr algn="ctr">
-              <a:spcAft>
-                <a:spcPts val="1200"/>
-              </a:spcAft>
-            </a:pPr>
-            <a:r>
-              <a:rPr lang="fr-FR" sz="2000" dirty="0" err="1"/>
-              <a:t>Make</a:t>
-            </a:r>
-            <a:r>
-              <a:rPr lang="fr-FR" sz="2000" dirty="0"/>
-              <a:t> </a:t>
-            </a:r>
-            <a:r>
-              <a:rPr lang="fr-FR" sz="2000" dirty="0" err="1"/>
-              <a:t>MyShop</a:t>
-            </a:r>
-            <a:r>
-              <a:rPr lang="fr-FR" sz="2000" dirty="0"/>
-              <a:t> page </a:t>
-            </a:r>
-            <a:r>
-              <a:rPr lang="fr-FR" sz="2000" b="1" dirty="0">
-                <a:solidFill>
-                  <a:schemeClr val="accent1"/>
-                </a:solidFill>
-              </a:rPr>
-              <a:t>responsive</a:t>
-            </a:r>
-            <a:endParaRPr lang="en-GB" sz="2000" b="1" dirty="0">
-              <a:solidFill>
-                <a:schemeClr val="accent1"/>
-              </a:solidFill>
-            </a:endParaRPr>
-          </a:p>
-        </p:txBody>
-      </p:sp>
-      <p:sp>
-        <p:nvSpPr>
-          <p:cNvPr id="8" name="Rectangle: Rounded Corners 7">
-            <a:extLst>
-              <a:ext uri="{FF2B5EF4-FFF2-40B4-BE49-F238E27FC236}">
-                <a16:creationId xmlns:a16="http://schemas.microsoft.com/office/drawing/2014/main" id="{0466A6D6-3AA1-41A2-8250-ED835DCD03A0}"/>
-              </a:ext>
-            </a:extLst>
-          </p:cNvPr>
-          <p:cNvSpPr/>
-          <p:nvPr/>
-        </p:nvSpPr>
-        <p:spPr>
-          <a:xfrm>
-            <a:off x="764736" y="4575174"/>
-            <a:ext cx="2292927" cy="1450757"/>
-          </a:xfrm>
-          <a:prstGeom prst="roundRect">
-            <a:avLst/>
-          </a:prstGeom>
-          <a:ln w="38100"/>
-        </p:spPr>
-        <p:style>
-          <a:lnRef idx="2">
-            <a:schemeClr val="accent2"/>
-          </a:lnRef>
-          <a:fillRef idx="1">
-            <a:schemeClr val="lt1"/>
-          </a:fillRef>
-          <a:effectRef idx="0">
-            <a:schemeClr val="accent2"/>
-          </a:effectRef>
-          <a:fontRef idx="minor">
-            <a:schemeClr val="dk1"/>
-          </a:fontRef>
-        </p:style>
-        <p:txBody>
-          <a:bodyPr rtlCol="0" anchor="ctr"/>
-          <a:lstStyle/>
-          <a:p>
-            <a:pPr algn="ctr">
-              <a:spcAft>
-                <a:spcPts val="1200"/>
-              </a:spcAft>
-            </a:pPr>
-            <a:r>
-              <a:rPr lang="en-US" sz="2000" dirty="0"/>
-              <a:t>Change Farmer Name to </a:t>
-            </a:r>
-            <a:r>
-              <a:rPr lang="en-US" sz="2000" b="1" dirty="0">
-                <a:solidFill>
-                  <a:schemeClr val="accent1"/>
-                </a:solidFill>
-              </a:rPr>
-              <a:t>Farmer Company</a:t>
-            </a:r>
-            <a:r>
-              <a:rPr lang="en-US" sz="2000" dirty="0"/>
-              <a:t> in </a:t>
-            </a:r>
-            <a:r>
-              <a:rPr lang="en-US" sz="2000" dirty="0" err="1"/>
-              <a:t>BasketItem</a:t>
-            </a:r>
-            <a:endParaRPr lang="en-GB" sz="2000" dirty="0"/>
-          </a:p>
-        </p:txBody>
-      </p:sp>
-      <p:sp>
-        <p:nvSpPr>
-          <p:cNvPr id="9" name="Rectangle: Rounded Corners 8">
-            <a:extLst>
-              <a:ext uri="{FF2B5EF4-FFF2-40B4-BE49-F238E27FC236}">
-                <a16:creationId xmlns:a16="http://schemas.microsoft.com/office/drawing/2014/main" id="{0253B68B-52FE-463A-89DD-10D678C63932}"/>
-              </a:ext>
-            </a:extLst>
-          </p:cNvPr>
-          <p:cNvSpPr/>
-          <p:nvPr/>
-        </p:nvSpPr>
-        <p:spPr>
-          <a:xfrm>
-            <a:off x="6586586" y="1821445"/>
-            <a:ext cx="2096231" cy="1171639"/>
-          </a:xfrm>
-          <a:prstGeom prst="roundRect">
-            <a:avLst/>
-          </a:prstGeom>
-          <a:ln w="38100"/>
-        </p:spPr>
-        <p:style>
-          <a:lnRef idx="2">
-            <a:schemeClr val="accent2"/>
-          </a:lnRef>
-          <a:fillRef idx="1">
-            <a:schemeClr val="lt1"/>
-          </a:fillRef>
-          <a:effectRef idx="0">
-            <a:schemeClr val="accent2"/>
-          </a:effectRef>
-          <a:fontRef idx="minor">
-            <a:schemeClr val="dk1"/>
-          </a:fontRef>
-        </p:style>
-        <p:txBody>
-          <a:bodyPr rtlCol="0" anchor="ctr"/>
-          <a:lstStyle/>
-          <a:p>
-            <a:pPr algn="ctr">
-              <a:spcAft>
-                <a:spcPts val="1200"/>
-              </a:spcAft>
-            </a:pPr>
-            <a:r>
-              <a:rPr lang="en-US" sz="2000" b="1" dirty="0">
-                <a:solidFill>
-                  <a:schemeClr val="accent1"/>
-                </a:solidFill>
-              </a:rPr>
-              <a:t>Redirect to login </a:t>
-            </a:r>
-            <a:r>
-              <a:rPr lang="en-US" sz="2000" dirty="0"/>
-              <a:t>after registration</a:t>
-            </a:r>
-            <a:endParaRPr lang="en-GB" sz="2000" dirty="0"/>
-          </a:p>
-        </p:txBody>
-      </p:sp>
-      <p:sp>
-        <p:nvSpPr>
-          <p:cNvPr id="10" name="Rectangle: Rounded Corners 9">
-            <a:extLst>
-              <a:ext uri="{FF2B5EF4-FFF2-40B4-BE49-F238E27FC236}">
-                <a16:creationId xmlns:a16="http://schemas.microsoft.com/office/drawing/2014/main" id="{FD3C100A-6C9A-4C5C-82B4-C63B39325BE3}"/>
-              </a:ext>
-            </a:extLst>
-          </p:cNvPr>
-          <p:cNvSpPr/>
-          <p:nvPr/>
-        </p:nvSpPr>
-        <p:spPr>
-          <a:xfrm>
-            <a:off x="9445642" y="4098099"/>
-            <a:ext cx="2187424" cy="1508645"/>
-          </a:xfrm>
-          <a:prstGeom prst="roundRect">
-            <a:avLst/>
-          </a:prstGeom>
-          <a:ln w="38100"/>
-        </p:spPr>
-        <p:style>
-          <a:lnRef idx="2">
-            <a:schemeClr val="accent2"/>
-          </a:lnRef>
-          <a:fillRef idx="1">
-            <a:schemeClr val="lt1"/>
-          </a:fillRef>
-          <a:effectRef idx="0">
-            <a:schemeClr val="accent2"/>
-          </a:effectRef>
-          <a:fontRef idx="minor">
-            <a:schemeClr val="dk1"/>
-          </a:fontRef>
-        </p:style>
-        <p:txBody>
-          <a:bodyPr rtlCol="0" anchor="ctr"/>
-          <a:lstStyle/>
-          <a:p>
-            <a:pPr algn="ctr">
-              <a:spcAft>
-                <a:spcPts val="1200"/>
-              </a:spcAft>
-            </a:pPr>
-            <a:r>
-              <a:rPr lang="en-US" sz="2000" b="1" dirty="0">
-                <a:solidFill>
-                  <a:schemeClr val="accent1"/>
-                </a:solidFill>
-              </a:rPr>
-              <a:t>Add confirmation </a:t>
-            </a:r>
-            <a:r>
-              <a:rPr lang="en-US" sz="2000" dirty="0"/>
-              <a:t>after adding product to </a:t>
-            </a:r>
-            <a:r>
-              <a:rPr lang="en-US" sz="2000" dirty="0" err="1"/>
-              <a:t>MyShop</a:t>
-            </a:r>
-            <a:endParaRPr lang="en-GB" sz="2000" dirty="0"/>
-          </a:p>
-        </p:txBody>
-      </p:sp>
-      <p:sp>
-        <p:nvSpPr>
-          <p:cNvPr id="11" name="Rectangle: Rounded Corners 10">
-            <a:extLst>
-              <a:ext uri="{FF2B5EF4-FFF2-40B4-BE49-F238E27FC236}">
-                <a16:creationId xmlns:a16="http://schemas.microsoft.com/office/drawing/2014/main" id="{D3403DA1-0E11-4EFC-B787-8A90A32407F2}"/>
-              </a:ext>
-            </a:extLst>
-          </p:cNvPr>
-          <p:cNvSpPr/>
-          <p:nvPr/>
-        </p:nvSpPr>
-        <p:spPr>
-          <a:xfrm>
-            <a:off x="7202373" y="4740101"/>
-            <a:ext cx="2096380" cy="1285830"/>
-          </a:xfrm>
-          <a:prstGeom prst="roundRect">
-            <a:avLst/>
-          </a:prstGeom>
-          <a:ln w="38100"/>
-        </p:spPr>
-        <p:style>
-          <a:lnRef idx="2">
-            <a:schemeClr val="accent2"/>
-          </a:lnRef>
-          <a:fillRef idx="1">
-            <a:schemeClr val="lt1"/>
-          </a:fillRef>
-          <a:effectRef idx="0">
-            <a:schemeClr val="accent2"/>
-          </a:effectRef>
-          <a:fontRef idx="minor">
-            <a:schemeClr val="dk1"/>
-          </a:fontRef>
-        </p:style>
-        <p:txBody>
-          <a:bodyPr rtlCol="0" anchor="ctr"/>
-          <a:lstStyle/>
-          <a:p>
-            <a:pPr algn="ctr">
-              <a:spcAft>
-                <a:spcPts val="1200"/>
-              </a:spcAft>
-            </a:pPr>
-            <a:r>
-              <a:rPr lang="fr-FR" sz="2000" dirty="0"/>
-              <a:t>Fix </a:t>
-            </a:r>
-            <a:r>
-              <a:rPr lang="fr-FR" sz="2000" b="1" dirty="0" err="1">
-                <a:solidFill>
-                  <a:schemeClr val="accent1"/>
-                </a:solidFill>
-              </a:rPr>
-              <a:t>PendingCancelation</a:t>
-            </a:r>
-            <a:r>
-              <a:rPr lang="fr-FR" sz="2000" b="1" dirty="0">
-                <a:solidFill>
-                  <a:schemeClr val="accent1"/>
-                </a:solidFill>
-              </a:rPr>
-              <a:t> </a:t>
-            </a:r>
-            <a:r>
-              <a:rPr lang="fr-FR" sz="2000" b="1" dirty="0" err="1">
-                <a:solidFill>
-                  <a:schemeClr val="accent1"/>
-                </a:solidFill>
-              </a:rPr>
-              <a:t>algorithm</a:t>
-            </a:r>
-            <a:endParaRPr lang="en-GB" sz="2000" b="1" dirty="0">
-              <a:solidFill>
-                <a:schemeClr val="accent1"/>
-              </a:solidFill>
-            </a:endParaRPr>
-          </a:p>
-        </p:txBody>
-      </p:sp>
-      <p:sp>
-        <p:nvSpPr>
-          <p:cNvPr id="12" name="Rectangle: Rounded Corners 11">
-            <a:extLst>
-              <a:ext uri="{FF2B5EF4-FFF2-40B4-BE49-F238E27FC236}">
-                <a16:creationId xmlns:a16="http://schemas.microsoft.com/office/drawing/2014/main" id="{2AF74024-C087-434F-9108-8D88DA7D4C18}"/>
-              </a:ext>
-            </a:extLst>
-          </p:cNvPr>
-          <p:cNvSpPr/>
-          <p:nvPr/>
-        </p:nvSpPr>
-        <p:spPr>
-          <a:xfrm>
-            <a:off x="5871946" y="3254900"/>
-            <a:ext cx="1762755" cy="1327513"/>
-          </a:xfrm>
-          <a:prstGeom prst="roundRect">
-            <a:avLst/>
-          </a:prstGeom>
-          <a:ln w="38100"/>
-        </p:spPr>
-        <p:style>
-          <a:lnRef idx="2">
-            <a:schemeClr val="accent2"/>
-          </a:lnRef>
-          <a:fillRef idx="1">
-            <a:schemeClr val="lt1"/>
-          </a:fillRef>
-          <a:effectRef idx="0">
-            <a:schemeClr val="accent2"/>
-          </a:effectRef>
-          <a:fontRef idx="minor">
-            <a:schemeClr val="dk1"/>
-          </a:fontRef>
-        </p:style>
-        <p:txBody>
-          <a:bodyPr rtlCol="0" anchor="ctr"/>
-          <a:lstStyle/>
-          <a:p>
-            <a:pPr algn="ctr">
-              <a:spcAft>
-                <a:spcPts val="1200"/>
-              </a:spcAft>
-            </a:pPr>
-            <a:r>
-              <a:rPr lang="en-US" sz="2000" b="1" dirty="0">
-                <a:solidFill>
-                  <a:schemeClr val="accent1"/>
-                </a:solidFill>
-              </a:rPr>
-              <a:t>Add total price </a:t>
-            </a:r>
-            <a:r>
-              <a:rPr lang="en-US" sz="2000" dirty="0"/>
-              <a:t>to order rows in </a:t>
-            </a:r>
-            <a:r>
-              <a:rPr lang="en-US" sz="2000" dirty="0" err="1"/>
-              <a:t>db</a:t>
-            </a:r>
-            <a:endParaRPr lang="en-GB" sz="2000" dirty="0"/>
-          </a:p>
-        </p:txBody>
-      </p:sp>
-      <p:sp>
-        <p:nvSpPr>
-          <p:cNvPr id="14" name="Rectangle: Rounded Corners 13">
-            <a:extLst>
-              <a:ext uri="{FF2B5EF4-FFF2-40B4-BE49-F238E27FC236}">
-                <a16:creationId xmlns:a16="http://schemas.microsoft.com/office/drawing/2014/main" id="{C927FAA7-75AC-49D7-A8DC-B1CBC69B1C7F}"/>
-              </a:ext>
-            </a:extLst>
-          </p:cNvPr>
-          <p:cNvSpPr/>
-          <p:nvPr/>
-        </p:nvSpPr>
-        <p:spPr>
-          <a:xfrm>
-            <a:off x="7953731" y="3229392"/>
-            <a:ext cx="1458172" cy="918536"/>
-          </a:xfrm>
-          <a:prstGeom prst="roundRect">
-            <a:avLst/>
-          </a:prstGeom>
-          <a:ln w="38100"/>
-        </p:spPr>
-        <p:style>
-          <a:lnRef idx="2">
-            <a:schemeClr val="accent2"/>
-          </a:lnRef>
-          <a:fillRef idx="1">
-            <a:schemeClr val="lt1"/>
-          </a:fillRef>
-          <a:effectRef idx="0">
-            <a:schemeClr val="accent2"/>
-          </a:effectRef>
-          <a:fontRef idx="minor">
-            <a:schemeClr val="dk1"/>
-          </a:fontRef>
-        </p:style>
-        <p:txBody>
-          <a:bodyPr rtlCol="0" anchor="ctr"/>
-          <a:lstStyle/>
-          <a:p>
-            <a:pPr algn="ctr">
-              <a:spcAft>
-                <a:spcPts val="1200"/>
-              </a:spcAft>
-            </a:pPr>
-            <a:r>
-              <a:rPr lang="fr-FR" sz="2000" dirty="0" err="1"/>
-              <a:t>Improve</a:t>
-            </a:r>
-            <a:r>
-              <a:rPr lang="fr-FR" sz="2000" dirty="0"/>
-              <a:t> </a:t>
-            </a:r>
-            <a:r>
-              <a:rPr lang="fr-FR" sz="2000" b="1" dirty="0" err="1">
-                <a:solidFill>
-                  <a:schemeClr val="accent1"/>
-                </a:solidFill>
-              </a:rPr>
-              <a:t>Coverage</a:t>
-            </a:r>
-            <a:endParaRPr lang="en-GB" sz="2000" b="1" dirty="0">
-              <a:solidFill>
-                <a:schemeClr val="accent1"/>
-              </a:solidFill>
-            </a:endParaRPr>
-          </a:p>
-        </p:txBody>
-      </p:sp>
-      <p:sp>
-        <p:nvSpPr>
-          <p:cNvPr id="15" name="Rectangle: Rounded Corners 14">
-            <a:extLst>
-              <a:ext uri="{FF2B5EF4-FFF2-40B4-BE49-F238E27FC236}">
-                <a16:creationId xmlns:a16="http://schemas.microsoft.com/office/drawing/2014/main" id="{2EE1E33C-4DC4-4CD7-A2C9-BCF77C5E50F5}"/>
-              </a:ext>
-            </a:extLst>
-          </p:cNvPr>
-          <p:cNvSpPr/>
-          <p:nvPr/>
-        </p:nvSpPr>
-        <p:spPr>
-          <a:xfrm>
-            <a:off x="3283273" y="3429000"/>
-            <a:ext cx="1909993" cy="1285830"/>
-          </a:xfrm>
-          <a:prstGeom prst="roundRect">
-            <a:avLst/>
-          </a:prstGeom>
-          <a:ln w="38100"/>
-        </p:spPr>
-        <p:style>
-          <a:lnRef idx="2">
-            <a:schemeClr val="accent2"/>
-          </a:lnRef>
-          <a:fillRef idx="1">
-            <a:schemeClr val="lt1"/>
-          </a:fillRef>
-          <a:effectRef idx="0">
-            <a:schemeClr val="accent2"/>
-          </a:effectRef>
-          <a:fontRef idx="minor">
-            <a:schemeClr val="dk1"/>
-          </a:fontRef>
-        </p:style>
-        <p:txBody>
-          <a:bodyPr rtlCol="0" anchor="ctr"/>
-          <a:lstStyle/>
-          <a:p>
-            <a:pPr algn="ctr">
-              <a:spcAft>
-                <a:spcPts val="1200"/>
-              </a:spcAft>
-            </a:pPr>
-            <a:r>
-              <a:rPr lang="en-US" sz="2000" dirty="0"/>
-              <a:t>Add </a:t>
-            </a:r>
-            <a:r>
-              <a:rPr lang="en-US" sz="2000" b="1" dirty="0">
-                <a:solidFill>
-                  <a:schemeClr val="accent1"/>
-                </a:solidFill>
-              </a:rPr>
-              <a:t>category selector </a:t>
-            </a:r>
-            <a:r>
-              <a:rPr lang="en-US" sz="2000" dirty="0"/>
-              <a:t>in My Shop</a:t>
-            </a:r>
-            <a:endParaRPr lang="en-GB" sz="2000" dirty="0"/>
           </a:p>
         </p:txBody>
       </p:sp>
     </p:spTree>
     <p:extLst>
       <p:ext uri="{BB962C8B-B14F-4D97-AF65-F5344CB8AC3E}">
-        <p14:creationId xmlns:p14="http://schemas.microsoft.com/office/powerpoint/2010/main" val="3064612125"/>
+        <p14:creationId xmlns:p14="http://schemas.microsoft.com/office/powerpoint/2010/main" val="1699485188"/>
       </p:ext>
     </p:extLst>
   </p:cSld>

</xml_diff>